<commit_message>
Rename scene to content in Binary glTF extension spec
</commit_message>
<xml_diff>
--- a/extensions/Khronos/KHR_binary_glTF/figures/Figures.pptx
+++ b/extensions/Khronos/KHR_binary_glTF/figures/Figures.pptx
@@ -1,19 +1,114 @@
 
 <file path=ppt/presentation.xml><?xml version="1.0" encoding="utf-8"?>
-<p:presentation xmlns:a="http://schemas.openxmlformats.org/drawingml/2006/main" xmlns:p="http://schemas.openxmlformats.org/presentationml/2006/main" xmlns:r="http://schemas.openxmlformats.org/officeDocument/2006/relationships">
+<p:presentation xmlns:a="http://schemas.openxmlformats.org/drawingml/2006/main" xmlns:r="http://schemas.openxmlformats.org/officeDocument/2006/relationships" xmlns:p="http://schemas.openxmlformats.org/presentationml/2006/main">
   <p:sldMasterIdLst>
-    <p:sldMasterId id="2147483648" r:id="rId2"/>
+    <p:sldMasterId id="2147483648" r:id="rId1"/>
   </p:sldMasterIdLst>
   <p:sldIdLst>
-    <p:sldId id="256" r:id="rId3"/>
+    <p:sldId id="256" r:id="rId2"/>
   </p:sldIdLst>
-  <p:sldSz cx="9144000" cy="6858000"/>
-  <p:notesSz cx="7559675" cy="10691812"/>
+  <p:sldSz cx="9144000" cy="6858000" type="screen4x3"/>
+  <p:notesSz cx="7559675" cy="10691813"/>
+  <p:defaultTextStyle>
+    <a:defPPr>
+      <a:defRPr lang="en-US"/>
+    </a:defPPr>
+    <a:lvl1pPr marL="0" algn="l" defTabSz="914400" rtl="0" eaLnBrk="1" latinLnBrk="0" hangingPunct="1">
+      <a:defRPr sz="1800" kern="1200">
+        <a:solidFill>
+          <a:schemeClr val="tx1"/>
+        </a:solidFill>
+        <a:latin typeface="+mn-lt"/>
+        <a:ea typeface="+mn-ea"/>
+        <a:cs typeface="+mn-cs"/>
+      </a:defRPr>
+    </a:lvl1pPr>
+    <a:lvl2pPr marL="457200" algn="l" defTabSz="914400" rtl="0" eaLnBrk="1" latinLnBrk="0" hangingPunct="1">
+      <a:defRPr sz="1800" kern="1200">
+        <a:solidFill>
+          <a:schemeClr val="tx1"/>
+        </a:solidFill>
+        <a:latin typeface="+mn-lt"/>
+        <a:ea typeface="+mn-ea"/>
+        <a:cs typeface="+mn-cs"/>
+      </a:defRPr>
+    </a:lvl2pPr>
+    <a:lvl3pPr marL="914400" algn="l" defTabSz="914400" rtl="0" eaLnBrk="1" latinLnBrk="0" hangingPunct="1">
+      <a:defRPr sz="1800" kern="1200">
+        <a:solidFill>
+          <a:schemeClr val="tx1"/>
+        </a:solidFill>
+        <a:latin typeface="+mn-lt"/>
+        <a:ea typeface="+mn-ea"/>
+        <a:cs typeface="+mn-cs"/>
+      </a:defRPr>
+    </a:lvl3pPr>
+    <a:lvl4pPr marL="1371600" algn="l" defTabSz="914400" rtl="0" eaLnBrk="1" latinLnBrk="0" hangingPunct="1">
+      <a:defRPr sz="1800" kern="1200">
+        <a:solidFill>
+          <a:schemeClr val="tx1"/>
+        </a:solidFill>
+        <a:latin typeface="+mn-lt"/>
+        <a:ea typeface="+mn-ea"/>
+        <a:cs typeface="+mn-cs"/>
+      </a:defRPr>
+    </a:lvl4pPr>
+    <a:lvl5pPr marL="1828800" algn="l" defTabSz="914400" rtl="0" eaLnBrk="1" latinLnBrk="0" hangingPunct="1">
+      <a:defRPr sz="1800" kern="1200">
+        <a:solidFill>
+          <a:schemeClr val="tx1"/>
+        </a:solidFill>
+        <a:latin typeface="+mn-lt"/>
+        <a:ea typeface="+mn-ea"/>
+        <a:cs typeface="+mn-cs"/>
+      </a:defRPr>
+    </a:lvl5pPr>
+    <a:lvl6pPr marL="2286000" algn="l" defTabSz="914400" rtl="0" eaLnBrk="1" latinLnBrk="0" hangingPunct="1">
+      <a:defRPr sz="1800" kern="1200">
+        <a:solidFill>
+          <a:schemeClr val="tx1"/>
+        </a:solidFill>
+        <a:latin typeface="+mn-lt"/>
+        <a:ea typeface="+mn-ea"/>
+        <a:cs typeface="+mn-cs"/>
+      </a:defRPr>
+    </a:lvl6pPr>
+    <a:lvl7pPr marL="2743200" algn="l" defTabSz="914400" rtl="0" eaLnBrk="1" latinLnBrk="0" hangingPunct="1">
+      <a:defRPr sz="1800" kern="1200">
+        <a:solidFill>
+          <a:schemeClr val="tx1"/>
+        </a:solidFill>
+        <a:latin typeface="+mn-lt"/>
+        <a:ea typeface="+mn-ea"/>
+        <a:cs typeface="+mn-cs"/>
+      </a:defRPr>
+    </a:lvl7pPr>
+    <a:lvl8pPr marL="3200400" algn="l" defTabSz="914400" rtl="0" eaLnBrk="1" latinLnBrk="0" hangingPunct="1">
+      <a:defRPr sz="1800" kern="1200">
+        <a:solidFill>
+          <a:schemeClr val="tx1"/>
+        </a:solidFill>
+        <a:latin typeface="+mn-lt"/>
+        <a:ea typeface="+mn-ea"/>
+        <a:cs typeface="+mn-cs"/>
+      </a:defRPr>
+    </a:lvl8pPr>
+    <a:lvl9pPr marL="3657600" algn="l" defTabSz="914400" rtl="0" eaLnBrk="1" latinLnBrk="0" hangingPunct="1">
+      <a:defRPr sz="1800" kern="1200">
+        <a:solidFill>
+          <a:schemeClr val="tx1"/>
+        </a:solidFill>
+        <a:latin typeface="+mn-lt"/>
+        <a:ea typeface="+mn-ea"/>
+        <a:cs typeface="+mn-cs"/>
+      </a:defRPr>
+    </a:lvl9pPr>
+  </p:defaultTextStyle>
 </p:presentation>
 </file>
 
 <file path=ppt/slideLayouts/slideLayout1.xml><?xml version="1.0" encoding="utf-8"?>
-<p:sldLayout xmlns:a="http://schemas.openxmlformats.org/drawingml/2006/main" xmlns:p="http://schemas.openxmlformats.org/presentationml/2006/main" xmlns:r="http://schemas.openxmlformats.org/officeDocument/2006/relationships" type="blank" preserve="1">
+<p:sldLayout xmlns:a="http://schemas.openxmlformats.org/drawingml/2006/main" xmlns:r="http://schemas.openxmlformats.org/officeDocument/2006/relationships" xmlns:p="http://schemas.openxmlformats.org/presentationml/2006/main" type="blank" preserve="1">
   <p:cSld name="Blank Slide">
     <p:spTree>
       <p:nvGrpSpPr>
@@ -31,11 +126,14 @@
       </p:grpSpPr>
     </p:spTree>
   </p:cSld>
+  <p:clrMapOvr>
+    <a:masterClrMapping/>
+  </p:clrMapOvr>
 </p:sldLayout>
 </file>
 
 <file path=ppt/slideLayouts/slideLayout10.xml><?xml version="1.0" encoding="utf-8"?>
-<p:sldLayout xmlns:a="http://schemas.openxmlformats.org/drawingml/2006/main" xmlns:p="http://schemas.openxmlformats.org/presentationml/2006/main" xmlns:r="http://schemas.openxmlformats.org/officeDocument/2006/relationships" type="objOverTx" preserve="1">
+<p:sldLayout xmlns:a="http://schemas.openxmlformats.org/drawingml/2006/main" xmlns:r="http://schemas.openxmlformats.org/officeDocument/2006/relationships" xmlns:p="http://schemas.openxmlformats.org/presentationml/2006/main" type="objOverTx" preserve="1">
   <p:cSld name="Title, Content over Content">
     <p:spTree>
       <p:nvGrpSpPr>
@@ -71,7 +169,8 @@
           </a:prstGeom>
         </p:spPr>
         <p:txBody>
-          <a:bodyPr lIns="0" rIns="0" tIns="0" bIns="0" anchor="ctr"/>
+          <a:bodyPr lIns="0" tIns="0" rIns="0" bIns="0" anchor="ctr"/>
+          <a:lstStyle/>
           <a:p>
             <a:pPr algn="ctr"/>
             <a:endParaRPr/>
@@ -98,7 +197,8 @@
           </a:prstGeom>
         </p:spPr>
         <p:txBody>
-          <a:bodyPr lIns="0" rIns="0" tIns="0" bIns="0"/>
+          <a:bodyPr lIns="0" tIns="0" rIns="0" bIns="0"/>
+          <a:lstStyle/>
           <a:p>
             <a:endParaRPr/>
           </a:p>
@@ -124,7 +224,8 @@
           </a:prstGeom>
         </p:spPr>
         <p:txBody>
-          <a:bodyPr lIns="0" rIns="0" tIns="0" bIns="0"/>
+          <a:bodyPr lIns="0" tIns="0" rIns="0" bIns="0"/>
+          <a:lstStyle/>
           <a:p>
             <a:endParaRPr/>
           </a:p>
@@ -132,11 +233,14 @@
       </p:sp>
     </p:spTree>
   </p:cSld>
+  <p:clrMapOvr>
+    <a:masterClrMapping/>
+  </p:clrMapOvr>
 </p:sldLayout>
 </file>
 
 <file path=ppt/slideLayouts/slideLayout11.xml><?xml version="1.0" encoding="utf-8"?>
-<p:sldLayout xmlns:a="http://schemas.openxmlformats.org/drawingml/2006/main" xmlns:p="http://schemas.openxmlformats.org/presentationml/2006/main" xmlns:r="http://schemas.openxmlformats.org/officeDocument/2006/relationships" type="fourObj" preserve="1">
+<p:sldLayout xmlns:a="http://schemas.openxmlformats.org/drawingml/2006/main" xmlns:r="http://schemas.openxmlformats.org/officeDocument/2006/relationships" xmlns:p="http://schemas.openxmlformats.org/presentationml/2006/main" type="fourObj" preserve="1">
   <p:cSld name="Title, 4 Content">
     <p:spTree>
       <p:nvGrpSpPr>
@@ -172,7 +276,8 @@
           </a:prstGeom>
         </p:spPr>
         <p:txBody>
-          <a:bodyPr lIns="0" rIns="0" tIns="0" bIns="0" anchor="ctr"/>
+          <a:bodyPr lIns="0" tIns="0" rIns="0" bIns="0" anchor="ctr"/>
+          <a:lstStyle/>
           <a:p>
             <a:pPr algn="ctr"/>
             <a:endParaRPr/>
@@ -199,7 +304,8 @@
           </a:prstGeom>
         </p:spPr>
         <p:txBody>
-          <a:bodyPr lIns="0" rIns="0" tIns="0" bIns="0"/>
+          <a:bodyPr lIns="0" tIns="0" rIns="0" bIns="0"/>
+          <a:lstStyle/>
           <a:p>
             <a:endParaRPr/>
           </a:p>
@@ -225,7 +331,8 @@
           </a:prstGeom>
         </p:spPr>
         <p:txBody>
-          <a:bodyPr lIns="0" rIns="0" tIns="0" bIns="0"/>
+          <a:bodyPr lIns="0" tIns="0" rIns="0" bIns="0"/>
+          <a:lstStyle/>
           <a:p>
             <a:endParaRPr/>
           </a:p>
@@ -251,7 +358,8 @@
           </a:prstGeom>
         </p:spPr>
         <p:txBody>
-          <a:bodyPr lIns="0" rIns="0" tIns="0" bIns="0"/>
+          <a:bodyPr lIns="0" tIns="0" rIns="0" bIns="0"/>
+          <a:lstStyle/>
           <a:p>
             <a:endParaRPr/>
           </a:p>
@@ -277,7 +385,8 @@
           </a:prstGeom>
         </p:spPr>
         <p:txBody>
-          <a:bodyPr lIns="0" rIns="0" tIns="0" bIns="0"/>
+          <a:bodyPr lIns="0" tIns="0" rIns="0" bIns="0"/>
+          <a:lstStyle/>
           <a:p>
             <a:endParaRPr/>
           </a:p>
@@ -285,11 +394,14 @@
       </p:sp>
     </p:spTree>
   </p:cSld>
+  <p:clrMapOvr>
+    <a:masterClrMapping/>
+  </p:clrMapOvr>
 </p:sldLayout>
 </file>
 
 <file path=ppt/slideLayouts/slideLayout12.xml><?xml version="1.0" encoding="utf-8"?>
-<p:sldLayout xmlns:a="http://schemas.openxmlformats.org/drawingml/2006/main" xmlns:p="http://schemas.openxmlformats.org/presentationml/2006/main" xmlns:r="http://schemas.openxmlformats.org/officeDocument/2006/relationships" type="blank" preserve="1">
+<p:sldLayout xmlns:a="http://schemas.openxmlformats.org/drawingml/2006/main" xmlns:r="http://schemas.openxmlformats.org/officeDocument/2006/relationships" xmlns:p="http://schemas.openxmlformats.org/presentationml/2006/main" type="blank" preserve="1">
   <p:cSld name="Title, 6 Content">
     <p:spTree>
       <p:nvGrpSpPr>
@@ -325,7 +437,8 @@
           </a:prstGeom>
         </p:spPr>
         <p:txBody>
-          <a:bodyPr lIns="0" rIns="0" tIns="0" bIns="0" anchor="ctr"/>
+          <a:bodyPr lIns="0" tIns="0" rIns="0" bIns="0" anchor="ctr"/>
+          <a:lstStyle/>
           <a:p>
             <a:pPr algn="ctr"/>
             <a:endParaRPr/>
@@ -352,7 +465,8 @@
           </a:prstGeom>
         </p:spPr>
         <p:txBody>
-          <a:bodyPr lIns="0" rIns="0" tIns="0" bIns="0"/>
+          <a:bodyPr lIns="0" tIns="0" rIns="0" bIns="0"/>
+          <a:lstStyle/>
           <a:p>
             <a:endParaRPr/>
           </a:p>
@@ -378,7 +492,8 @@
           </a:prstGeom>
         </p:spPr>
         <p:txBody>
-          <a:bodyPr lIns="0" rIns="0" tIns="0" bIns="0"/>
+          <a:bodyPr lIns="0" tIns="0" rIns="0" bIns="0"/>
+          <a:lstStyle/>
           <a:p>
             <a:endParaRPr/>
           </a:p>
@@ -386,7 +501,7 @@
       </p:sp>
       <p:pic>
         <p:nvPicPr>
-          <p:cNvPr id="34" name="" descr=""/>
+          <p:cNvPr id="34" name="Picture 33"/>
           <p:cNvPicPr/>
           <p:nvPr/>
         </p:nvPicPr>
@@ -411,12 +526,12 @@
       </p:pic>
       <p:pic>
         <p:nvPicPr>
-          <p:cNvPr id="35" name="" descr=""/>
+          <p:cNvPr id="35" name="Picture 34"/>
           <p:cNvPicPr/>
           <p:nvPr/>
         </p:nvPicPr>
         <p:blipFill>
-          <a:blip r:embed="rId3"/>
+          <a:blip r:embed="rId2"/>
           <a:stretch>
             <a:fillRect/>
           </a:stretch>
@@ -436,11 +551,14 @@
       </p:pic>
     </p:spTree>
   </p:cSld>
+  <p:clrMapOvr>
+    <a:masterClrMapping/>
+  </p:clrMapOvr>
 </p:sldLayout>
 </file>
 
 <file path=ppt/slideLayouts/slideLayout2.xml><?xml version="1.0" encoding="utf-8"?>
-<p:sldLayout xmlns:a="http://schemas.openxmlformats.org/drawingml/2006/main" xmlns:p="http://schemas.openxmlformats.org/presentationml/2006/main" xmlns:r="http://schemas.openxmlformats.org/officeDocument/2006/relationships" type="tx" preserve="1">
+<p:sldLayout xmlns:a="http://schemas.openxmlformats.org/drawingml/2006/main" xmlns:r="http://schemas.openxmlformats.org/officeDocument/2006/relationships" xmlns:p="http://schemas.openxmlformats.org/presentationml/2006/main" type="tx" preserve="1">
   <p:cSld name="Title Slide">
     <p:spTree>
       <p:nvGrpSpPr>
@@ -476,7 +594,8 @@
           </a:prstGeom>
         </p:spPr>
         <p:txBody>
-          <a:bodyPr lIns="0" rIns="0" tIns="0" bIns="0" anchor="ctr"/>
+          <a:bodyPr lIns="0" tIns="0" rIns="0" bIns="0" anchor="ctr"/>
+          <a:lstStyle/>
           <a:p>
             <a:pPr algn="ctr"/>
             <a:endParaRPr/>
@@ -503,7 +622,8 @@
           </a:prstGeom>
         </p:spPr>
         <p:txBody>
-          <a:bodyPr lIns="0" rIns="0" tIns="0" bIns="0" anchor="ctr"/>
+          <a:bodyPr lIns="0" tIns="0" rIns="0" bIns="0" anchor="ctr"/>
+          <a:lstStyle/>
           <a:p>
             <a:pPr algn="ctr"/>
             <a:endParaRPr/>
@@ -512,11 +632,14 @@
       </p:sp>
     </p:spTree>
   </p:cSld>
+  <p:clrMapOvr>
+    <a:masterClrMapping/>
+  </p:clrMapOvr>
 </p:sldLayout>
 </file>
 
 <file path=ppt/slideLayouts/slideLayout3.xml><?xml version="1.0" encoding="utf-8"?>
-<p:sldLayout xmlns:a="http://schemas.openxmlformats.org/drawingml/2006/main" xmlns:p="http://schemas.openxmlformats.org/presentationml/2006/main" xmlns:r="http://schemas.openxmlformats.org/officeDocument/2006/relationships" type="obj" preserve="1">
+<p:sldLayout xmlns:a="http://schemas.openxmlformats.org/drawingml/2006/main" xmlns:r="http://schemas.openxmlformats.org/officeDocument/2006/relationships" xmlns:p="http://schemas.openxmlformats.org/presentationml/2006/main" type="obj" preserve="1">
   <p:cSld name="Title, Content">
     <p:spTree>
       <p:nvGrpSpPr>
@@ -552,7 +675,8 @@
           </a:prstGeom>
         </p:spPr>
         <p:txBody>
-          <a:bodyPr lIns="0" rIns="0" tIns="0" bIns="0" anchor="ctr"/>
+          <a:bodyPr lIns="0" tIns="0" rIns="0" bIns="0" anchor="ctr"/>
+          <a:lstStyle/>
           <a:p>
             <a:pPr algn="ctr"/>
             <a:endParaRPr/>
@@ -579,7 +703,8 @@
           </a:prstGeom>
         </p:spPr>
         <p:txBody>
-          <a:bodyPr lIns="0" rIns="0" tIns="0" bIns="0"/>
+          <a:bodyPr lIns="0" tIns="0" rIns="0" bIns="0"/>
+          <a:lstStyle/>
           <a:p>
             <a:endParaRPr/>
           </a:p>
@@ -587,11 +712,14 @@
       </p:sp>
     </p:spTree>
   </p:cSld>
+  <p:clrMapOvr>
+    <a:masterClrMapping/>
+  </p:clrMapOvr>
 </p:sldLayout>
 </file>
 
 <file path=ppt/slideLayouts/slideLayout4.xml><?xml version="1.0" encoding="utf-8"?>
-<p:sldLayout xmlns:a="http://schemas.openxmlformats.org/drawingml/2006/main" xmlns:p="http://schemas.openxmlformats.org/presentationml/2006/main" xmlns:r="http://schemas.openxmlformats.org/officeDocument/2006/relationships" type="twoObj" preserve="1">
+<p:sldLayout xmlns:a="http://schemas.openxmlformats.org/drawingml/2006/main" xmlns:r="http://schemas.openxmlformats.org/officeDocument/2006/relationships" xmlns:p="http://schemas.openxmlformats.org/presentationml/2006/main" type="twoObj" preserve="1">
   <p:cSld name="Title, 2 Content">
     <p:spTree>
       <p:nvGrpSpPr>
@@ -627,7 +755,8 @@
           </a:prstGeom>
         </p:spPr>
         <p:txBody>
-          <a:bodyPr lIns="0" rIns="0" tIns="0" bIns="0" anchor="ctr"/>
+          <a:bodyPr lIns="0" tIns="0" rIns="0" bIns="0" anchor="ctr"/>
+          <a:lstStyle/>
           <a:p>
             <a:pPr algn="ctr"/>
             <a:endParaRPr/>
@@ -654,7 +783,8 @@
           </a:prstGeom>
         </p:spPr>
         <p:txBody>
-          <a:bodyPr lIns="0" rIns="0" tIns="0" bIns="0"/>
+          <a:bodyPr lIns="0" tIns="0" rIns="0" bIns="0"/>
+          <a:lstStyle/>
           <a:p>
             <a:endParaRPr/>
           </a:p>
@@ -680,7 +810,8 @@
           </a:prstGeom>
         </p:spPr>
         <p:txBody>
-          <a:bodyPr lIns="0" rIns="0" tIns="0" bIns="0"/>
+          <a:bodyPr lIns="0" tIns="0" rIns="0" bIns="0"/>
+          <a:lstStyle/>
           <a:p>
             <a:endParaRPr/>
           </a:p>
@@ -688,11 +819,14 @@
       </p:sp>
     </p:spTree>
   </p:cSld>
+  <p:clrMapOvr>
+    <a:masterClrMapping/>
+  </p:clrMapOvr>
 </p:sldLayout>
 </file>
 
 <file path=ppt/slideLayouts/slideLayout5.xml><?xml version="1.0" encoding="utf-8"?>
-<p:sldLayout xmlns:a="http://schemas.openxmlformats.org/drawingml/2006/main" xmlns:p="http://schemas.openxmlformats.org/presentationml/2006/main" xmlns:r="http://schemas.openxmlformats.org/officeDocument/2006/relationships" type="titleOnly" preserve="1">
+<p:sldLayout xmlns:a="http://schemas.openxmlformats.org/drawingml/2006/main" xmlns:r="http://schemas.openxmlformats.org/officeDocument/2006/relationships" xmlns:p="http://schemas.openxmlformats.org/presentationml/2006/main" type="titleOnly" preserve="1">
   <p:cSld name="Title Only">
     <p:spTree>
       <p:nvGrpSpPr>
@@ -728,7 +862,8 @@
           </a:prstGeom>
         </p:spPr>
         <p:txBody>
-          <a:bodyPr lIns="0" rIns="0" tIns="0" bIns="0" anchor="ctr"/>
+          <a:bodyPr lIns="0" tIns="0" rIns="0" bIns="0" anchor="ctr"/>
+          <a:lstStyle/>
           <a:p>
             <a:pPr algn="ctr"/>
             <a:endParaRPr/>
@@ -737,11 +872,14 @@
       </p:sp>
     </p:spTree>
   </p:cSld>
+  <p:clrMapOvr>
+    <a:masterClrMapping/>
+  </p:clrMapOvr>
 </p:sldLayout>
 </file>
 
 <file path=ppt/slideLayouts/slideLayout6.xml><?xml version="1.0" encoding="utf-8"?>
-<p:sldLayout xmlns:a="http://schemas.openxmlformats.org/drawingml/2006/main" xmlns:p="http://schemas.openxmlformats.org/presentationml/2006/main" xmlns:r="http://schemas.openxmlformats.org/officeDocument/2006/relationships" type="objOnly" preserve="1">
+<p:sldLayout xmlns:a="http://schemas.openxmlformats.org/drawingml/2006/main" xmlns:r="http://schemas.openxmlformats.org/officeDocument/2006/relationships" xmlns:p="http://schemas.openxmlformats.org/presentationml/2006/main" type="objOnly" preserve="1">
   <p:cSld name="Centered Text">
     <p:spTree>
       <p:nvGrpSpPr>
@@ -777,7 +915,8 @@
           </a:prstGeom>
         </p:spPr>
         <p:txBody>
-          <a:bodyPr lIns="0" rIns="0" tIns="0" bIns="0" anchor="ctr"/>
+          <a:bodyPr lIns="0" tIns="0" rIns="0" bIns="0" anchor="ctr"/>
+          <a:lstStyle/>
           <a:p>
             <a:pPr algn="ctr"/>
             <a:endParaRPr/>
@@ -786,11 +925,14 @@
       </p:sp>
     </p:spTree>
   </p:cSld>
+  <p:clrMapOvr>
+    <a:masterClrMapping/>
+  </p:clrMapOvr>
 </p:sldLayout>
 </file>
 
 <file path=ppt/slideLayouts/slideLayout7.xml><?xml version="1.0" encoding="utf-8"?>
-<p:sldLayout xmlns:a="http://schemas.openxmlformats.org/drawingml/2006/main" xmlns:p="http://schemas.openxmlformats.org/presentationml/2006/main" xmlns:r="http://schemas.openxmlformats.org/officeDocument/2006/relationships" type="twoObjAndObj" preserve="1">
+<p:sldLayout xmlns:a="http://schemas.openxmlformats.org/drawingml/2006/main" xmlns:r="http://schemas.openxmlformats.org/officeDocument/2006/relationships" xmlns:p="http://schemas.openxmlformats.org/presentationml/2006/main" type="twoObjAndObj" preserve="1">
   <p:cSld name="Title, 2 Content and Content">
     <p:spTree>
       <p:nvGrpSpPr>
@@ -826,7 +968,8 @@
           </a:prstGeom>
         </p:spPr>
         <p:txBody>
-          <a:bodyPr lIns="0" rIns="0" tIns="0" bIns="0" anchor="ctr"/>
+          <a:bodyPr lIns="0" tIns="0" rIns="0" bIns="0" anchor="ctr"/>
+          <a:lstStyle/>
           <a:p>
             <a:pPr algn="ctr"/>
             <a:endParaRPr/>
@@ -853,7 +996,8 @@
           </a:prstGeom>
         </p:spPr>
         <p:txBody>
-          <a:bodyPr lIns="0" rIns="0" tIns="0" bIns="0"/>
+          <a:bodyPr lIns="0" tIns="0" rIns="0" bIns="0"/>
+          <a:lstStyle/>
           <a:p>
             <a:endParaRPr/>
           </a:p>
@@ -879,7 +1023,8 @@
           </a:prstGeom>
         </p:spPr>
         <p:txBody>
-          <a:bodyPr lIns="0" rIns="0" tIns="0" bIns="0"/>
+          <a:bodyPr lIns="0" tIns="0" rIns="0" bIns="0"/>
+          <a:lstStyle/>
           <a:p>
             <a:endParaRPr/>
           </a:p>
@@ -905,7 +1050,8 @@
           </a:prstGeom>
         </p:spPr>
         <p:txBody>
-          <a:bodyPr lIns="0" rIns="0" tIns="0" bIns="0"/>
+          <a:bodyPr lIns="0" tIns="0" rIns="0" bIns="0"/>
+          <a:lstStyle/>
           <a:p>
             <a:endParaRPr/>
           </a:p>
@@ -913,11 +1059,14 @@
       </p:sp>
     </p:spTree>
   </p:cSld>
+  <p:clrMapOvr>
+    <a:masterClrMapping/>
+  </p:clrMapOvr>
 </p:sldLayout>
 </file>
 
 <file path=ppt/slideLayouts/slideLayout8.xml><?xml version="1.0" encoding="utf-8"?>
-<p:sldLayout xmlns:a="http://schemas.openxmlformats.org/drawingml/2006/main" xmlns:p="http://schemas.openxmlformats.org/presentationml/2006/main" xmlns:r="http://schemas.openxmlformats.org/officeDocument/2006/relationships" type="objAndTwoObj" preserve="1">
+<p:sldLayout xmlns:a="http://schemas.openxmlformats.org/drawingml/2006/main" xmlns:r="http://schemas.openxmlformats.org/officeDocument/2006/relationships" xmlns:p="http://schemas.openxmlformats.org/presentationml/2006/main" type="objAndTwoObj" preserve="1">
   <p:cSld name="Title Content and 2 Content">
     <p:spTree>
       <p:nvGrpSpPr>
@@ -953,7 +1102,8 @@
           </a:prstGeom>
         </p:spPr>
         <p:txBody>
-          <a:bodyPr lIns="0" rIns="0" tIns="0" bIns="0" anchor="ctr"/>
+          <a:bodyPr lIns="0" tIns="0" rIns="0" bIns="0" anchor="ctr"/>
+          <a:lstStyle/>
           <a:p>
             <a:pPr algn="ctr"/>
             <a:endParaRPr/>
@@ -980,7 +1130,8 @@
           </a:prstGeom>
         </p:spPr>
         <p:txBody>
-          <a:bodyPr lIns="0" rIns="0" tIns="0" bIns="0"/>
+          <a:bodyPr lIns="0" tIns="0" rIns="0" bIns="0"/>
+          <a:lstStyle/>
           <a:p>
             <a:endParaRPr/>
           </a:p>
@@ -1006,7 +1157,8 @@
           </a:prstGeom>
         </p:spPr>
         <p:txBody>
-          <a:bodyPr lIns="0" rIns="0" tIns="0" bIns="0"/>
+          <a:bodyPr lIns="0" tIns="0" rIns="0" bIns="0"/>
+          <a:lstStyle/>
           <a:p>
             <a:endParaRPr/>
           </a:p>
@@ -1032,7 +1184,8 @@
           </a:prstGeom>
         </p:spPr>
         <p:txBody>
-          <a:bodyPr lIns="0" rIns="0" tIns="0" bIns="0"/>
+          <a:bodyPr lIns="0" tIns="0" rIns="0" bIns="0"/>
+          <a:lstStyle/>
           <a:p>
             <a:endParaRPr/>
           </a:p>
@@ -1040,11 +1193,14 @@
       </p:sp>
     </p:spTree>
   </p:cSld>
+  <p:clrMapOvr>
+    <a:masterClrMapping/>
+  </p:clrMapOvr>
 </p:sldLayout>
 </file>
 
 <file path=ppt/slideLayouts/slideLayout9.xml><?xml version="1.0" encoding="utf-8"?>
-<p:sldLayout xmlns:a="http://schemas.openxmlformats.org/drawingml/2006/main" xmlns:p="http://schemas.openxmlformats.org/presentationml/2006/main" xmlns:r="http://schemas.openxmlformats.org/officeDocument/2006/relationships" type="twoObjOverTx" preserve="1">
+<p:sldLayout xmlns:a="http://schemas.openxmlformats.org/drawingml/2006/main" xmlns:r="http://schemas.openxmlformats.org/officeDocument/2006/relationships" xmlns:p="http://schemas.openxmlformats.org/presentationml/2006/main" type="twoObjOverTx" preserve="1">
   <p:cSld name="Title, 2 Content over Content">
     <p:spTree>
       <p:nvGrpSpPr>
@@ -1080,7 +1236,8 @@
           </a:prstGeom>
         </p:spPr>
         <p:txBody>
-          <a:bodyPr lIns="0" rIns="0" tIns="0" bIns="0" anchor="ctr"/>
+          <a:bodyPr lIns="0" tIns="0" rIns="0" bIns="0" anchor="ctr"/>
+          <a:lstStyle/>
           <a:p>
             <a:pPr algn="ctr"/>
             <a:endParaRPr/>
@@ -1107,7 +1264,8 @@
           </a:prstGeom>
         </p:spPr>
         <p:txBody>
-          <a:bodyPr lIns="0" rIns="0" tIns="0" bIns="0"/>
+          <a:bodyPr lIns="0" tIns="0" rIns="0" bIns="0"/>
+          <a:lstStyle/>
           <a:p>
             <a:endParaRPr/>
           </a:p>
@@ -1133,7 +1291,8 @@
           </a:prstGeom>
         </p:spPr>
         <p:txBody>
-          <a:bodyPr lIns="0" rIns="0" tIns="0" bIns="0"/>
+          <a:bodyPr lIns="0" tIns="0" rIns="0" bIns="0"/>
+          <a:lstStyle/>
           <a:p>
             <a:endParaRPr/>
           </a:p>
@@ -1159,7 +1318,8 @@
           </a:prstGeom>
         </p:spPr>
         <p:txBody>
-          <a:bodyPr lIns="0" rIns="0" tIns="0" bIns="0"/>
+          <a:bodyPr lIns="0" tIns="0" rIns="0" bIns="0"/>
+          <a:lstStyle/>
           <a:p>
             <a:endParaRPr/>
           </a:p>
@@ -1167,17 +1327,21 @@
       </p:sp>
     </p:spTree>
   </p:cSld>
+  <p:clrMapOvr>
+    <a:masterClrMapping/>
+  </p:clrMapOvr>
 </p:sldLayout>
 </file>
 
 <file path=ppt/slideMasters/slideMaster1.xml><?xml version="1.0" encoding="utf-8"?>
-<p:sldMaster xmlns:a="http://schemas.openxmlformats.org/drawingml/2006/main" xmlns:p="http://schemas.openxmlformats.org/presentationml/2006/main" xmlns:r="http://schemas.openxmlformats.org/officeDocument/2006/relationships">
+<p:sldMaster xmlns:a="http://schemas.openxmlformats.org/drawingml/2006/main" xmlns:r="http://schemas.openxmlformats.org/officeDocument/2006/relationships" xmlns:p="http://schemas.openxmlformats.org/presentationml/2006/main">
   <p:cSld>
     <p:bg>
       <p:bgPr>
         <a:solidFill>
-          <a:srgbClr val="ffffff"/>
+          <a:srgbClr val="FFFFFF"/>
         </a:solidFill>
+        <a:effectLst/>
       </p:bgPr>
     </p:bg>
     <p:spTree>
@@ -1196,7 +1360,7 @@
       </p:grpSpPr>
       <p:sp>
         <p:nvSpPr>
-          <p:cNvPr id="0" name="PlaceHolder 1"/>
+          <p:cNvPr id="2" name="PlaceHolder 1"/>
           <p:cNvSpPr>
             <a:spLocks noGrp="1"/>
           </p:cNvSpPr>
@@ -1214,7 +1378,8 @@
           </a:prstGeom>
         </p:spPr>
         <p:txBody>
-          <a:bodyPr lIns="0" rIns="0" tIns="0" bIns="0" anchor="ctr"/>
+          <a:bodyPr lIns="0" tIns="0" rIns="0" bIns="0" anchor="ctr"/>
+          <a:lstStyle/>
           <a:p>
             <a:r>
               <a:rPr lang="en-US">
@@ -1228,7 +1393,7 @@
       </p:sp>
       <p:sp>
         <p:nvSpPr>
-          <p:cNvPr id="1" name="PlaceHolder 2"/>
+          <p:cNvPr id="3" name="PlaceHolder 2"/>
           <p:cNvSpPr>
             <a:spLocks noGrp="1"/>
           </p:cNvSpPr>
@@ -1246,7 +1411,8 @@
           </a:prstGeom>
         </p:spPr>
         <p:txBody>
-          <a:bodyPr lIns="0" rIns="0" tIns="0" bIns="0"/>
+          <a:bodyPr lIns="0" tIns="0" rIns="0" bIns="0"/>
+          <a:lstStyle/>
           <a:p>
             <a:pPr>
               <a:buSzPct val="45000"/>
@@ -1349,26 +1515,306 @@
       </p:sp>
     </p:spTree>
   </p:cSld>
-  <p:clrMap bg1="lt1" bg2="lt2" tx1="dk1" tx2="dk2" accent1="accent1" accent2="accent2" accent3="accent3" accent4="accent4" accent5="accent5" accent6="accent6" hlink="hlink" folHlink="folHlink"/>
+  <p:clrMap bg1="lt1" tx1="dk1" bg2="lt2" tx2="dk2" accent1="accent1" accent2="accent2" accent3="accent3" accent4="accent4" accent5="accent5" accent6="accent6" hlink="hlink" folHlink="folHlink"/>
   <p:sldLayoutIdLst>
-    <p:sldLayoutId id="2147483649" r:id="rId2"/>
-    <p:sldLayoutId id="2147483650" r:id="rId3"/>
-    <p:sldLayoutId id="2147483651" r:id="rId4"/>
-    <p:sldLayoutId id="2147483652" r:id="rId5"/>
-    <p:sldLayoutId id="2147483653" r:id="rId6"/>
-    <p:sldLayoutId id="2147483654" r:id="rId7"/>
-    <p:sldLayoutId id="2147483655" r:id="rId8"/>
-    <p:sldLayoutId id="2147483656" r:id="rId9"/>
-    <p:sldLayoutId id="2147483657" r:id="rId10"/>
-    <p:sldLayoutId id="2147483658" r:id="rId11"/>
-    <p:sldLayoutId id="2147483659" r:id="rId12"/>
-    <p:sldLayoutId id="2147483660" r:id="rId13"/>
+    <p:sldLayoutId id="2147483649" r:id="rId1"/>
+    <p:sldLayoutId id="2147483650" r:id="rId2"/>
+    <p:sldLayoutId id="2147483651" r:id="rId3"/>
+    <p:sldLayoutId id="2147483652" r:id="rId4"/>
+    <p:sldLayoutId id="2147483653" r:id="rId5"/>
+    <p:sldLayoutId id="2147483654" r:id="rId6"/>
+    <p:sldLayoutId id="2147483655" r:id="rId7"/>
+    <p:sldLayoutId id="2147483656" r:id="rId8"/>
+    <p:sldLayoutId id="2147483657" r:id="rId9"/>
+    <p:sldLayoutId id="2147483658" r:id="rId10"/>
+    <p:sldLayoutId id="2147483659" r:id="rId11"/>
+    <p:sldLayoutId id="2147483660" r:id="rId12"/>
   </p:sldLayoutIdLst>
+  <p:txStyles>
+    <p:titleStyle>
+      <a:lvl1pPr algn="l" defTabSz="914400" rtl="0" eaLnBrk="1" latinLnBrk="0" hangingPunct="1">
+        <a:lnSpc>
+          <a:spcPct val="90000"/>
+        </a:lnSpc>
+        <a:spcBef>
+          <a:spcPct val="0"/>
+        </a:spcBef>
+        <a:buNone/>
+        <a:defRPr sz="4400" kern="1200">
+          <a:solidFill>
+            <a:schemeClr val="tx1"/>
+          </a:solidFill>
+          <a:latin typeface="+mj-lt"/>
+          <a:ea typeface="+mj-ea"/>
+          <a:cs typeface="+mj-cs"/>
+        </a:defRPr>
+      </a:lvl1pPr>
+    </p:titleStyle>
+    <p:bodyStyle>
+      <a:lvl1pPr marL="228600" indent="-228600" algn="l" defTabSz="914400" rtl="0" eaLnBrk="1" latinLnBrk="0" hangingPunct="1">
+        <a:lnSpc>
+          <a:spcPct val="90000"/>
+        </a:lnSpc>
+        <a:spcBef>
+          <a:spcPts val="1000"/>
+        </a:spcBef>
+        <a:buFont typeface="Arial" panose="020B0604020202020204" pitchFamily="34" charset="0"/>
+        <a:buChar char="•"/>
+        <a:defRPr sz="2800" kern="1200">
+          <a:solidFill>
+            <a:schemeClr val="tx1"/>
+          </a:solidFill>
+          <a:latin typeface="+mn-lt"/>
+          <a:ea typeface="+mn-ea"/>
+          <a:cs typeface="+mn-cs"/>
+        </a:defRPr>
+      </a:lvl1pPr>
+      <a:lvl2pPr marL="685800" indent="-228600" algn="l" defTabSz="914400" rtl="0" eaLnBrk="1" latinLnBrk="0" hangingPunct="1">
+        <a:lnSpc>
+          <a:spcPct val="90000"/>
+        </a:lnSpc>
+        <a:spcBef>
+          <a:spcPts val="500"/>
+        </a:spcBef>
+        <a:buFont typeface="Arial" panose="020B0604020202020204" pitchFamily="34" charset="0"/>
+        <a:buChar char="•"/>
+        <a:defRPr sz="2400" kern="1200">
+          <a:solidFill>
+            <a:schemeClr val="tx1"/>
+          </a:solidFill>
+          <a:latin typeface="+mn-lt"/>
+          <a:ea typeface="+mn-ea"/>
+          <a:cs typeface="+mn-cs"/>
+        </a:defRPr>
+      </a:lvl2pPr>
+      <a:lvl3pPr marL="1143000" indent="-228600" algn="l" defTabSz="914400" rtl="0" eaLnBrk="1" latinLnBrk="0" hangingPunct="1">
+        <a:lnSpc>
+          <a:spcPct val="90000"/>
+        </a:lnSpc>
+        <a:spcBef>
+          <a:spcPts val="500"/>
+        </a:spcBef>
+        <a:buFont typeface="Arial" panose="020B0604020202020204" pitchFamily="34" charset="0"/>
+        <a:buChar char="•"/>
+        <a:defRPr sz="2000" kern="1200">
+          <a:solidFill>
+            <a:schemeClr val="tx1"/>
+          </a:solidFill>
+          <a:latin typeface="+mn-lt"/>
+          <a:ea typeface="+mn-ea"/>
+          <a:cs typeface="+mn-cs"/>
+        </a:defRPr>
+      </a:lvl3pPr>
+      <a:lvl4pPr marL="1600200" indent="-228600" algn="l" defTabSz="914400" rtl="0" eaLnBrk="1" latinLnBrk="0" hangingPunct="1">
+        <a:lnSpc>
+          <a:spcPct val="90000"/>
+        </a:lnSpc>
+        <a:spcBef>
+          <a:spcPts val="500"/>
+        </a:spcBef>
+        <a:buFont typeface="Arial" panose="020B0604020202020204" pitchFamily="34" charset="0"/>
+        <a:buChar char="•"/>
+        <a:defRPr sz="1800" kern="1200">
+          <a:solidFill>
+            <a:schemeClr val="tx1"/>
+          </a:solidFill>
+          <a:latin typeface="+mn-lt"/>
+          <a:ea typeface="+mn-ea"/>
+          <a:cs typeface="+mn-cs"/>
+        </a:defRPr>
+      </a:lvl4pPr>
+      <a:lvl5pPr marL="2057400" indent="-228600" algn="l" defTabSz="914400" rtl="0" eaLnBrk="1" latinLnBrk="0" hangingPunct="1">
+        <a:lnSpc>
+          <a:spcPct val="90000"/>
+        </a:lnSpc>
+        <a:spcBef>
+          <a:spcPts val="500"/>
+        </a:spcBef>
+        <a:buFont typeface="Arial" panose="020B0604020202020204" pitchFamily="34" charset="0"/>
+        <a:buChar char="•"/>
+        <a:defRPr sz="1800" kern="1200">
+          <a:solidFill>
+            <a:schemeClr val="tx1"/>
+          </a:solidFill>
+          <a:latin typeface="+mn-lt"/>
+          <a:ea typeface="+mn-ea"/>
+          <a:cs typeface="+mn-cs"/>
+        </a:defRPr>
+      </a:lvl5pPr>
+      <a:lvl6pPr marL="2514600" indent="-228600" algn="l" defTabSz="914400" rtl="0" eaLnBrk="1" latinLnBrk="0" hangingPunct="1">
+        <a:lnSpc>
+          <a:spcPct val="90000"/>
+        </a:lnSpc>
+        <a:spcBef>
+          <a:spcPts val="500"/>
+        </a:spcBef>
+        <a:buFont typeface="Arial" panose="020B0604020202020204" pitchFamily="34" charset="0"/>
+        <a:buChar char="•"/>
+        <a:defRPr sz="1800" kern="1200">
+          <a:solidFill>
+            <a:schemeClr val="tx1"/>
+          </a:solidFill>
+          <a:latin typeface="+mn-lt"/>
+          <a:ea typeface="+mn-ea"/>
+          <a:cs typeface="+mn-cs"/>
+        </a:defRPr>
+      </a:lvl6pPr>
+      <a:lvl7pPr marL="2971800" indent="-228600" algn="l" defTabSz="914400" rtl="0" eaLnBrk="1" latinLnBrk="0" hangingPunct="1">
+        <a:lnSpc>
+          <a:spcPct val="90000"/>
+        </a:lnSpc>
+        <a:spcBef>
+          <a:spcPts val="500"/>
+        </a:spcBef>
+        <a:buFont typeface="Arial" panose="020B0604020202020204" pitchFamily="34" charset="0"/>
+        <a:buChar char="•"/>
+        <a:defRPr sz="1800" kern="1200">
+          <a:solidFill>
+            <a:schemeClr val="tx1"/>
+          </a:solidFill>
+          <a:latin typeface="+mn-lt"/>
+          <a:ea typeface="+mn-ea"/>
+          <a:cs typeface="+mn-cs"/>
+        </a:defRPr>
+      </a:lvl7pPr>
+      <a:lvl8pPr marL="3429000" indent="-228600" algn="l" defTabSz="914400" rtl="0" eaLnBrk="1" latinLnBrk="0" hangingPunct="1">
+        <a:lnSpc>
+          <a:spcPct val="90000"/>
+        </a:lnSpc>
+        <a:spcBef>
+          <a:spcPts val="500"/>
+        </a:spcBef>
+        <a:buFont typeface="Arial" panose="020B0604020202020204" pitchFamily="34" charset="0"/>
+        <a:buChar char="•"/>
+        <a:defRPr sz="1800" kern="1200">
+          <a:solidFill>
+            <a:schemeClr val="tx1"/>
+          </a:solidFill>
+          <a:latin typeface="+mn-lt"/>
+          <a:ea typeface="+mn-ea"/>
+          <a:cs typeface="+mn-cs"/>
+        </a:defRPr>
+      </a:lvl8pPr>
+      <a:lvl9pPr marL="3886200" indent="-228600" algn="l" defTabSz="914400" rtl="0" eaLnBrk="1" latinLnBrk="0" hangingPunct="1">
+        <a:lnSpc>
+          <a:spcPct val="90000"/>
+        </a:lnSpc>
+        <a:spcBef>
+          <a:spcPts val="500"/>
+        </a:spcBef>
+        <a:buFont typeface="Arial" panose="020B0604020202020204" pitchFamily="34" charset="0"/>
+        <a:buChar char="•"/>
+        <a:defRPr sz="1800" kern="1200">
+          <a:solidFill>
+            <a:schemeClr val="tx1"/>
+          </a:solidFill>
+          <a:latin typeface="+mn-lt"/>
+          <a:ea typeface="+mn-ea"/>
+          <a:cs typeface="+mn-cs"/>
+        </a:defRPr>
+      </a:lvl9pPr>
+    </p:bodyStyle>
+    <p:otherStyle>
+      <a:defPPr>
+        <a:defRPr lang="en-US"/>
+      </a:defPPr>
+      <a:lvl1pPr marL="0" algn="l" defTabSz="914400" rtl="0" eaLnBrk="1" latinLnBrk="0" hangingPunct="1">
+        <a:defRPr sz="1800" kern="1200">
+          <a:solidFill>
+            <a:schemeClr val="tx1"/>
+          </a:solidFill>
+          <a:latin typeface="+mn-lt"/>
+          <a:ea typeface="+mn-ea"/>
+          <a:cs typeface="+mn-cs"/>
+        </a:defRPr>
+      </a:lvl1pPr>
+      <a:lvl2pPr marL="457200" algn="l" defTabSz="914400" rtl="0" eaLnBrk="1" latinLnBrk="0" hangingPunct="1">
+        <a:defRPr sz="1800" kern="1200">
+          <a:solidFill>
+            <a:schemeClr val="tx1"/>
+          </a:solidFill>
+          <a:latin typeface="+mn-lt"/>
+          <a:ea typeface="+mn-ea"/>
+          <a:cs typeface="+mn-cs"/>
+        </a:defRPr>
+      </a:lvl2pPr>
+      <a:lvl3pPr marL="914400" algn="l" defTabSz="914400" rtl="0" eaLnBrk="1" latinLnBrk="0" hangingPunct="1">
+        <a:defRPr sz="1800" kern="1200">
+          <a:solidFill>
+            <a:schemeClr val="tx1"/>
+          </a:solidFill>
+          <a:latin typeface="+mn-lt"/>
+          <a:ea typeface="+mn-ea"/>
+          <a:cs typeface="+mn-cs"/>
+        </a:defRPr>
+      </a:lvl3pPr>
+      <a:lvl4pPr marL="1371600" algn="l" defTabSz="914400" rtl="0" eaLnBrk="1" latinLnBrk="0" hangingPunct="1">
+        <a:defRPr sz="1800" kern="1200">
+          <a:solidFill>
+            <a:schemeClr val="tx1"/>
+          </a:solidFill>
+          <a:latin typeface="+mn-lt"/>
+          <a:ea typeface="+mn-ea"/>
+          <a:cs typeface="+mn-cs"/>
+        </a:defRPr>
+      </a:lvl4pPr>
+      <a:lvl5pPr marL="1828800" algn="l" defTabSz="914400" rtl="0" eaLnBrk="1" latinLnBrk="0" hangingPunct="1">
+        <a:defRPr sz="1800" kern="1200">
+          <a:solidFill>
+            <a:schemeClr val="tx1"/>
+          </a:solidFill>
+          <a:latin typeface="+mn-lt"/>
+          <a:ea typeface="+mn-ea"/>
+          <a:cs typeface="+mn-cs"/>
+        </a:defRPr>
+      </a:lvl5pPr>
+      <a:lvl6pPr marL="2286000" algn="l" defTabSz="914400" rtl="0" eaLnBrk="1" latinLnBrk="0" hangingPunct="1">
+        <a:defRPr sz="1800" kern="1200">
+          <a:solidFill>
+            <a:schemeClr val="tx1"/>
+          </a:solidFill>
+          <a:latin typeface="+mn-lt"/>
+          <a:ea typeface="+mn-ea"/>
+          <a:cs typeface="+mn-cs"/>
+        </a:defRPr>
+      </a:lvl6pPr>
+      <a:lvl7pPr marL="2743200" algn="l" defTabSz="914400" rtl="0" eaLnBrk="1" latinLnBrk="0" hangingPunct="1">
+        <a:defRPr sz="1800" kern="1200">
+          <a:solidFill>
+            <a:schemeClr val="tx1"/>
+          </a:solidFill>
+          <a:latin typeface="+mn-lt"/>
+          <a:ea typeface="+mn-ea"/>
+          <a:cs typeface="+mn-cs"/>
+        </a:defRPr>
+      </a:lvl7pPr>
+      <a:lvl8pPr marL="3200400" algn="l" defTabSz="914400" rtl="0" eaLnBrk="1" latinLnBrk="0" hangingPunct="1">
+        <a:defRPr sz="1800" kern="1200">
+          <a:solidFill>
+            <a:schemeClr val="tx1"/>
+          </a:solidFill>
+          <a:latin typeface="+mn-lt"/>
+          <a:ea typeface="+mn-ea"/>
+          <a:cs typeface="+mn-cs"/>
+        </a:defRPr>
+      </a:lvl8pPr>
+      <a:lvl9pPr marL="3657600" algn="l" defTabSz="914400" rtl="0" eaLnBrk="1" latinLnBrk="0" hangingPunct="1">
+        <a:defRPr sz="1800" kern="1200">
+          <a:solidFill>
+            <a:schemeClr val="tx1"/>
+          </a:solidFill>
+          <a:latin typeface="+mn-lt"/>
+          <a:ea typeface="+mn-ea"/>
+          <a:cs typeface="+mn-cs"/>
+        </a:defRPr>
+      </a:lvl9pPr>
+    </p:otherStyle>
+  </p:txStyles>
 </p:sldMaster>
 </file>
 
 <file path=ppt/slides/slide1.xml><?xml version="1.0" encoding="utf-8"?>
-<p:sld xmlns:a="http://schemas.openxmlformats.org/drawingml/2006/main" xmlns:p="http://schemas.openxmlformats.org/presentationml/2006/main" xmlns:r="http://schemas.openxmlformats.org/officeDocument/2006/relationships">
+<p:sld xmlns:a="http://schemas.openxmlformats.org/drawingml/2006/main" xmlns:r="http://schemas.openxmlformats.org/officeDocument/2006/relationships" xmlns:p="http://schemas.openxmlformats.org/presentationml/2006/main">
   <p:cSld>
     <p:spTree>
       <p:nvGrpSpPr>
@@ -1407,7 +1853,8 @@
           </a:ln>
         </p:spPr>
         <p:txBody>
-          <a:bodyPr wrap="none" lIns="90000" rIns="90000" tIns="45000" bIns="45000"/>
+          <a:bodyPr wrap="none" lIns="90000" tIns="45000" rIns="90000" bIns="45000"/>
+          <a:lstStyle/>
           <a:p>
             <a:pPr algn="ctr">
               <a:lnSpc>
@@ -1443,7 +1890,7 @@
             <a:r>
               <a:rPr lang="en-US" sz="1200">
                 <a:solidFill>
-                  <a:srgbClr val="558ed5"/>
+                  <a:srgbClr val="558ED5"/>
                 </a:solidFill>
                 <a:latin typeface="Courier New"/>
               </a:rPr>
@@ -1485,7 +1932,8 @@
           </a:ln>
         </p:spPr>
         <p:txBody>
-          <a:bodyPr wrap="none" lIns="90000" rIns="90000" tIns="45000" bIns="45000"/>
+          <a:bodyPr wrap="none" lIns="90000" tIns="45000" rIns="90000" bIns="45000"/>
+          <a:lstStyle/>
           <a:p>
             <a:pPr algn="ctr">
               <a:lnSpc>
@@ -1521,7 +1969,7 @@
             <a:r>
               <a:rPr lang="en-US" sz="1200">
                 <a:solidFill>
-                  <a:srgbClr val="558ed5"/>
+                  <a:srgbClr val="558ED5"/>
                 </a:solidFill>
                 <a:latin typeface="Courier New"/>
               </a:rPr>
@@ -1563,7 +2011,8 @@
           </a:ln>
         </p:spPr>
         <p:txBody>
-          <a:bodyPr wrap="none" lIns="90000" rIns="90000" tIns="45000" bIns="45000"/>
+          <a:bodyPr wrap="none" lIns="90000" tIns="45000" rIns="90000" bIns="45000"/>
+          <a:lstStyle/>
           <a:p>
             <a:pPr algn="ctr">
               <a:lnSpc>
@@ -1571,15 +2020,15 @@
               </a:lnSpc>
             </a:pPr>
             <a:r>
-              <a:rPr lang="en-US" sz="1200">
+              <a:rPr lang="en-US" sz="1200" dirty="0" smtClean="0">
                 <a:solidFill>
                   <a:srgbClr val="000000"/>
                 </a:solidFill>
                 <a:latin typeface="Courier New"/>
               </a:rPr>
-              <a:t>sceneFormat</a:t>
-            </a:r>
-            <a:endParaRPr/>
+              <a:t>contentFormat</a:t>
+            </a:r>
+            <a:endParaRPr dirty="0"/>
           </a:p>
           <a:p>
             <a:pPr algn="ctr">
@@ -1588,7 +2037,7 @@
               </a:lnSpc>
             </a:pPr>
             <a:r>
-              <a:rPr lang="en-US" sz="1200">
+              <a:rPr lang="en-US" sz="1200" dirty="0">
                 <a:solidFill>
                   <a:srgbClr val="000000"/>
                 </a:solidFill>
@@ -1597,16 +2046,16 @@
               <a:t>(</a:t>
             </a:r>
             <a:r>
-              <a:rPr lang="en-US" sz="1200">
+              <a:rPr lang="en-US" sz="1200" dirty="0">
                 <a:solidFill>
-                  <a:srgbClr val="558ed5"/>
+                  <a:srgbClr val="558ED5"/>
                 </a:solidFill>
                 <a:latin typeface="Courier New"/>
               </a:rPr>
               <a:t>uint32</a:t>
             </a:r>
             <a:r>
-              <a:rPr lang="en-US" sz="1200">
+              <a:rPr lang="en-US" sz="1200" dirty="0">
                 <a:solidFill>
                   <a:srgbClr val="000000"/>
                 </a:solidFill>
@@ -1614,7 +2063,7 @@
               </a:rPr>
               <a:t>)</a:t>
             </a:r>
-            <a:endParaRPr/>
+            <a:endParaRPr dirty="0"/>
           </a:p>
         </p:txBody>
       </p:sp>
@@ -1641,7 +2090,8 @@
           </a:ln>
         </p:spPr>
         <p:txBody>
-          <a:bodyPr wrap="none" lIns="90000" rIns="90000" tIns="45000" bIns="45000"/>
+          <a:bodyPr wrap="none" lIns="90000" tIns="45000" rIns="90000" bIns="45000"/>
+          <a:lstStyle/>
           <a:p>
             <a:pPr algn="ctr">
               <a:lnSpc>
@@ -1649,15 +2099,24 @@
               </a:lnSpc>
             </a:pPr>
             <a:r>
-              <a:rPr lang="en-US" sz="1200">
+              <a:rPr lang="en-US" sz="1200" dirty="0" smtClean="0">
                 <a:solidFill>
                   <a:srgbClr val="000000"/>
                 </a:solidFill>
                 <a:latin typeface="Courier New"/>
               </a:rPr>
-              <a:t>sceneLength</a:t>
-            </a:r>
-            <a:endParaRPr/>
+              <a:t>content</a:t>
+            </a:r>
+            <a:r>
+              <a:rPr lang="en-US" sz="1200" dirty="0" smtClean="0">
+                <a:solidFill>
+                  <a:srgbClr val="000000"/>
+                </a:solidFill>
+                <a:latin typeface="Courier New"/>
+              </a:rPr>
+              <a:t>Length</a:t>
+            </a:r>
+            <a:endParaRPr dirty="0"/>
           </a:p>
           <a:p>
             <a:pPr algn="ctr">
@@ -1666,7 +2125,7 @@
               </a:lnSpc>
             </a:pPr>
             <a:r>
-              <a:rPr lang="en-US" sz="1200">
+              <a:rPr lang="en-US" sz="1200" dirty="0">
                 <a:solidFill>
                   <a:srgbClr val="000000"/>
                 </a:solidFill>
@@ -1675,16 +2134,16 @@
               <a:t>(</a:t>
             </a:r>
             <a:r>
-              <a:rPr lang="en-US" sz="1200">
+              <a:rPr lang="en-US" sz="1200" dirty="0">
                 <a:solidFill>
-                  <a:srgbClr val="558ed5"/>
+                  <a:srgbClr val="558ED5"/>
                 </a:solidFill>
                 <a:latin typeface="Courier New"/>
               </a:rPr>
               <a:t>uint32</a:t>
             </a:r>
             <a:r>
-              <a:rPr lang="en-US" sz="1200">
+              <a:rPr lang="en-US" sz="1200" dirty="0">
                 <a:solidFill>
                   <a:srgbClr val="000000"/>
                 </a:solidFill>
@@ -1692,7 +2151,7 @@
               </a:rPr>
               <a:t>)</a:t>
             </a:r>
-            <a:endParaRPr/>
+            <a:endParaRPr dirty="0"/>
           </a:p>
         </p:txBody>
       </p:sp>
@@ -1719,7 +2178,8 @@
           </a:ln>
         </p:spPr>
         <p:txBody>
-          <a:bodyPr wrap="none" lIns="90000" rIns="90000" tIns="45000" bIns="45000"/>
+          <a:bodyPr wrap="none" lIns="90000" tIns="45000" rIns="90000" bIns="45000"/>
+          <a:lstStyle/>
           <a:p>
             <a:pPr algn="ctr">
               <a:lnSpc>
@@ -1762,7 +2222,7 @@
             <a:avLst/>
           </a:prstGeom>
           <a:noFill/>
-          <a:ln cap="rnd" w="12600">
+          <a:ln w="12600" cap="rnd">
             <a:solidFill>
               <a:srgbClr val="000000"/>
             </a:solidFill>
@@ -1773,7 +2233,8 @@
           </a:ln>
         </p:spPr>
         <p:txBody>
-          <a:bodyPr wrap="none" lIns="90000" rIns="90000" tIns="45000" bIns="45000"/>
+          <a:bodyPr wrap="none" lIns="90000" tIns="45000" rIns="90000" bIns="45000"/>
+          <a:lstStyle/>
           <a:p>
             <a:pPr algn="ctr">
               <a:lnSpc>
@@ -1825,9 +2286,9 @@
             <a:avLst/>
           </a:prstGeom>
           <a:solidFill>
-            <a:srgbClr val="ffffff"/>
+            <a:srgbClr val="FFFFFF"/>
           </a:solidFill>
-          <a:ln cap="rnd" w="12600">
+          <a:ln w="12600" cap="rnd">
             <a:solidFill>
               <a:srgbClr val="000000"/>
             </a:solidFill>
@@ -1838,7 +2299,8 @@
           </a:ln>
         </p:spPr>
         <p:txBody>
-          <a:bodyPr lIns="90000" rIns="90000" tIns="45000" bIns="45000" anchor="ctr"/>
+          <a:bodyPr lIns="90000" tIns="45000" rIns="90000" bIns="45000" anchor="ctr"/>
+          <a:lstStyle/>
           <a:p>
             <a:pPr algn="ctr">
               <a:lnSpc>
@@ -1878,8 +2340,8 @@
               <a:srgbClr val="000000"/>
             </a:solidFill>
             <a:round/>
-            <a:headEnd len="med" type="arrow" w="med"/>
-            <a:tailEnd len="med" type="arrow" w="med"/>
+            <a:headEnd type="arrow" w="med" len="med"/>
+            <a:tailEnd type="arrow" w="med" len="med"/>
           </a:ln>
         </p:spPr>
       </p:sp>
@@ -1903,7 +2365,8 @@
           </a:ln>
         </p:spPr>
         <p:txBody>
-          <a:bodyPr wrap="none" lIns="90000" rIns="90000" tIns="45000" bIns="45000"/>
+          <a:bodyPr wrap="none" lIns="90000" tIns="45000" rIns="90000" bIns="45000"/>
+          <a:lstStyle/>
           <a:p>
             <a:pPr algn="ctr">
               <a:lnSpc>
@@ -1943,7 +2406,7 @@
               <a:srgbClr val="000000"/>
             </a:solidFill>
             <a:round/>
-            <a:tailEnd len="med" type="arrow" w="med"/>
+            <a:tailEnd type="arrow" w="med" len="med"/>
           </a:ln>
         </p:spPr>
       </p:sp>
@@ -1967,7 +2430,8 @@
           </a:ln>
         </p:spPr>
         <p:txBody>
-          <a:bodyPr wrap="none" lIns="90000" rIns="90000" tIns="45000" bIns="45000"/>
+          <a:bodyPr wrap="none" lIns="90000" tIns="45000" rIns="90000" bIns="45000"/>
+          <a:lstStyle/>
           <a:p>
             <a:pPr algn="ctr">
               <a:lnSpc>
@@ -2010,7 +2474,8 @@
           </a:ln>
         </p:spPr>
         <p:txBody>
-          <a:bodyPr wrap="none" lIns="90000" rIns="90000" tIns="45000" bIns="45000"/>
+          <a:bodyPr wrap="none" lIns="90000" tIns="45000" rIns="90000" bIns="45000"/>
+          <a:lstStyle/>
           <a:p>
             <a:pPr algn="ctr">
               <a:lnSpc>
@@ -2046,7 +2511,7 @@
             <a:r>
               <a:rPr lang="en-US" sz="1200">
                 <a:solidFill>
-                  <a:srgbClr val="558ed5"/>
+                  <a:srgbClr val="558ED5"/>
                 </a:solidFill>
                 <a:latin typeface="Courier New"/>
               </a:rPr>
@@ -2085,8 +2550,8 @@
               <a:srgbClr val="000000"/>
             </a:solidFill>
             <a:round/>
-            <a:headEnd len="med" type="arrow" w="med"/>
-            <a:tailEnd len="med" type="arrow" w="med"/>
+            <a:headEnd type="arrow" w="med" len="med"/>
+            <a:tailEnd type="arrow" w="med" len="med"/>
           </a:ln>
         </p:spPr>
       </p:sp>
@@ -2110,7 +2575,8 @@
           </a:ln>
         </p:spPr>
         <p:txBody>
-          <a:bodyPr wrap="none" lIns="90000" rIns="90000" tIns="45000" bIns="45000"/>
+          <a:bodyPr wrap="none" lIns="90000" tIns="45000" rIns="90000" bIns="45000"/>
+          <a:lstStyle/>
           <a:p>
             <a:pPr algn="ctr">
               <a:lnSpc>
@@ -2118,15 +2584,15 @@
               </a:lnSpc>
             </a:pPr>
             <a:r>
-              <a:rPr lang="en-US" sz="1200">
+              <a:rPr lang="en-US" sz="1200" dirty="0" smtClean="0">
                 <a:solidFill>
                   <a:srgbClr val="000000"/>
                 </a:solidFill>
                 <a:latin typeface="Courier New"/>
               </a:rPr>
-              <a:t>scene</a:t>
-            </a:r>
-            <a:endParaRPr/>
+              <a:t>content</a:t>
+            </a:r>
+            <a:endParaRPr dirty="0"/>
           </a:p>
         </p:txBody>
       </p:sp>
@@ -2150,8 +2616,8 @@
               <a:srgbClr val="000000"/>
             </a:solidFill>
             <a:round/>
-            <a:headEnd len="med" type="arrow" w="med"/>
-            <a:tailEnd len="med" type="arrow" w="med"/>
+            <a:headEnd type="arrow" w="med" len="med"/>
+            <a:tailEnd type="arrow" w="med" len="med"/>
           </a:ln>
         </p:spPr>
       </p:sp>
@@ -2175,7 +2641,8 @@
           </a:ln>
         </p:spPr>
         <p:txBody>
-          <a:bodyPr wrap="none" lIns="90000" rIns="90000" tIns="45000" bIns="45000"/>
+          <a:bodyPr wrap="none" lIns="90000" tIns="45000" rIns="90000" bIns="45000"/>
+          <a:lstStyle/>
           <a:p>
             <a:pPr algn="ctr">
               <a:lnSpc>
@@ -2210,6 +2677,7 @@
             <a:avLst/>
             <a:gdLst/>
             <a:ahLst/>
+            <a:cxnLst/>
             <a:rect l="0" t="0" r="r" b="b"/>
             <a:pathLst>
               <a:path w="3073" h="956">
@@ -2229,12 +2697,15 @@
               <a:srgbClr val="000000"/>
             </a:solidFill>
             <a:round/>
-            <a:tailEnd len="med" type="triangle" w="med"/>
+            <a:tailEnd type="triangle" w="med" len="med"/>
           </a:ln>
         </p:spPr>
       </p:sp>
     </p:spTree>
   </p:cSld>
+  <p:clrMapOvr>
+    <a:masterClrMapping/>
+  </p:clrMapOvr>
   <p:timing>
     <p:tnLst>
       <p:par>
@@ -2243,14 +2714,14 @@
             <p:seq>
               <p:cTn id="2" nodeType="mainSeq"/>
               <p:prevCondLst>
-                <p:cond delay="0" evt="onPrev">
+                <p:cond evt="onPrev" delay="0">
                   <p:tgtEl>
                     <p:sldTgt/>
                   </p:tgtEl>
                 </p:cond>
               </p:prevCondLst>
               <p:nextCondLst>
-                <p:cond delay="0" evt="onNext">
+                <p:cond evt="onNext" delay="0">
                   <p:tgtEl>
                     <p:sldTgt/>
                   </p:tgtEl>
@@ -2485,5 +2956,7 @@
       </a:bgFillStyleLst>
     </a:fmtScheme>
   </a:themeElements>
+  <a:objectDefaults/>
+  <a:extraClrSchemeLst/>
 </a:theme>
 </file>
</xml_diff>